<commit_message>
Change comment - OpenInjecjionsSimulation
</commit_message>
<xml_diff>
--- a/docs/how-to-slides/Gtg-Scenario injections, load, users.pptx
+++ b/docs/how-to-slides/Gtg-Scenario injections, load, users.pptx
@@ -212,7 +212,8 @@
           <a:p>
             <a:fld id="{6A72D27D-52CF-4BF0-BD59-3C9966197CF5}" type="datetimeFigureOut">
               <a:rPr lang="ru-RU" smtClean="0"/>
-              <a:t>12.07.2023</a:t>
+              <a:pPr/>
+              <a:t>13.07.2023</a:t>
             </a:fld>
             <a:endParaRPr lang="ru-RU"/>
           </a:p>
@@ -278,6 +279,7 @@
           <a:p>
             <a:fld id="{C54BD09A-D56A-4925-AF5B-E4DBC1D67935}" type="slidenum">
               <a:rPr lang="ru-RU" smtClean="0"/>
+              <a:pPr/>
               <a:t>‹#›</a:t>
             </a:fld>
             <a:endParaRPr lang="ru-RU"/>
@@ -372,7 +374,8 @@
           <a:p>
             <a:fld id="{95FA63F9-EEC3-456E-9C91-7A4CCE923535}" type="datetimeFigureOut">
               <a:rPr lang="ru-RU" smtClean="0"/>
-              <a:t>12.07.2023</a:t>
+              <a:pPr/>
+              <a:t>13.07.2023</a:t>
             </a:fld>
             <a:endParaRPr lang="ru-RU"/>
           </a:p>
@@ -500,6 +503,7 @@
           <a:p>
             <a:fld id="{7340A94E-0EDD-4E37-9605-FBB5966EEDFB}" type="slidenum">
               <a:rPr lang="ru-RU" smtClean="0"/>
+              <a:pPr/>
               <a:t>‹#›</a:t>
             </a:fld>
             <a:endParaRPr lang="ru-RU"/>
@@ -748,7 +752,7 @@
             <a:fld id="{C1027E9F-FA41-416A-9F2C-F465002B321A}" type="datetimeFigureOut">
               <a:rPr lang="ru-RU" smtClean="0"/>
               <a:pPr/>
-              <a:t>12.07.2023</a:t>
+              <a:t>13.07.2023</a:t>
             </a:fld>
             <a:endParaRPr lang="ru-RU"/>
           </a:p>
@@ -1109,7 +1113,7 @@
             <a:fld id="{C1027E9F-FA41-416A-9F2C-F465002B321A}" type="datetimeFigureOut">
               <a:rPr lang="ru-RU" smtClean="0"/>
               <a:pPr/>
-              <a:t>12.07.2023</a:t>
+              <a:t>13.07.2023</a:t>
             </a:fld>
             <a:endParaRPr lang="ru-RU"/>
           </a:p>
@@ -1286,7 +1290,7 @@
             <a:fld id="{C1027E9F-FA41-416A-9F2C-F465002B321A}" type="datetimeFigureOut">
               <a:rPr lang="ru-RU" smtClean="0"/>
               <a:pPr/>
-              <a:t>12.07.2023</a:t>
+              <a:t>13.07.2023</a:t>
             </a:fld>
             <a:endParaRPr lang="ru-RU"/>
           </a:p>
@@ -1523,7 +1527,7 @@
             <a:fld id="{C1027E9F-FA41-416A-9F2C-F465002B321A}" type="datetimeFigureOut">
               <a:rPr lang="ru-RU" smtClean="0"/>
               <a:pPr/>
-              <a:t>12.07.2023</a:t>
+              <a:t>13.07.2023</a:t>
             </a:fld>
             <a:endParaRPr lang="ru-RU"/>
           </a:p>
@@ -1794,7 +1798,7 @@
             <a:fld id="{C1027E9F-FA41-416A-9F2C-F465002B321A}" type="datetimeFigureOut">
               <a:rPr lang="ru-RU" smtClean="0"/>
               <a:pPr/>
-              <a:t>12.07.2023</a:t>
+              <a:t>13.07.2023</a:t>
             </a:fld>
             <a:endParaRPr lang="ru-RU"/>
           </a:p>
@@ -2016,7 +2020,7 @@
             <a:fld id="{C1027E9F-FA41-416A-9F2C-F465002B321A}" type="datetimeFigureOut">
               <a:rPr lang="ru-RU" smtClean="0"/>
               <a:pPr/>
-              <a:t>12.07.2023</a:t>
+              <a:t>13.07.2023</a:t>
             </a:fld>
             <a:endParaRPr lang="ru-RU"/>
           </a:p>
@@ -2370,7 +2374,7 @@
             <a:fld id="{C1027E9F-FA41-416A-9F2C-F465002B321A}" type="datetimeFigureOut">
               <a:rPr lang="ru-RU" smtClean="0"/>
               <a:pPr/>
-              <a:t>12.07.2023</a:t>
+              <a:t>13.07.2023</a:t>
             </a:fld>
             <a:endParaRPr lang="ru-RU"/>
           </a:p>
@@ -2604,7 +2608,7 @@
             <a:fld id="{C1027E9F-FA41-416A-9F2C-F465002B321A}" type="datetimeFigureOut">
               <a:rPr lang="ru-RU" smtClean="0"/>
               <a:pPr/>
-              <a:t>12.07.2023</a:t>
+              <a:t>13.07.2023</a:t>
             </a:fld>
             <a:endParaRPr lang="ru-RU"/>
           </a:p>
@@ -2746,7 +2750,7 @@
             <a:fld id="{C1027E9F-FA41-416A-9F2C-F465002B321A}" type="datetimeFigureOut">
               <a:rPr lang="ru-RU" smtClean="0"/>
               <a:pPr/>
-              <a:t>12.07.2023</a:t>
+              <a:t>13.07.2023</a:t>
             </a:fld>
             <a:endParaRPr lang="ru-RU"/>
           </a:p>
@@ -3025,7 +3029,7 @@
             <a:fld id="{C1027E9F-FA41-416A-9F2C-F465002B321A}" type="datetimeFigureOut">
               <a:rPr lang="ru-RU" smtClean="0"/>
               <a:pPr/>
-              <a:t>12.07.2023</a:t>
+              <a:t>13.07.2023</a:t>
             </a:fld>
             <a:endParaRPr lang="ru-RU"/>
           </a:p>
@@ -3434,7 +3438,7 @@
             <a:fld id="{C1027E9F-FA41-416A-9F2C-F465002B321A}" type="datetimeFigureOut">
               <a:rPr lang="ru-RU" smtClean="0"/>
               <a:pPr/>
-              <a:t>12.07.2023</a:t>
+              <a:t>13.07.2023</a:t>
             </a:fld>
             <a:endParaRPr lang="ru-RU"/>
           </a:p>
@@ -3774,7 +3778,7 @@
             <a:fld id="{C1027E9F-FA41-416A-9F2C-F465002B321A}" type="datetimeFigureOut">
               <a:rPr lang="ru-RU" smtClean="0"/>
               <a:pPr/>
-              <a:t>12.07.2023</a:t>
+              <a:t>13.07.2023</a:t>
             </a:fld>
             <a:endParaRPr lang="ru-RU"/>
           </a:p>
@@ -4455,13 +4459,8 @@
           <a:p>
             <a:r>
               <a:rPr lang="ru-RU" sz="1200" i="1" dirty="0" smtClean="0"/>
-              <a:t>Запуск одного пользователя на 1 </a:t>
-            </a:r>
-            <a:r>
-              <a:rPr lang="ru-RU" sz="1200" i="1" dirty="0" smtClean="0"/>
-              <a:t>итерацию</a:t>
-            </a:r>
-            <a:endParaRPr lang="ru-RU" sz="1200" i="1" dirty="0" smtClean="0"/>
+              <a:t>Запуск одного пользователя на 1 итерацию</a:t>
+            </a:r>
           </a:p>
           <a:p>
             <a:endParaRPr lang="ru-RU" sz="1200" dirty="0" smtClean="0"/>
@@ -5309,11 +5308,7 @@
           <a:p>
             <a:r>
               <a:rPr lang="ru-RU" sz="1600" b="1" dirty="0" smtClean="0"/>
-              <a:t>Ответьте </a:t>
-            </a:r>
-            <a:r>
-              <a:rPr lang="ru-RU" sz="1600" b="1" dirty="0" smtClean="0"/>
-              <a:t>на вопрос:</a:t>
+              <a:t>Ответьте на вопрос:</a:t>
             </a:r>
           </a:p>
           <a:p>
@@ -6269,13 +6264,7 @@
               <a:rPr lang="ru-RU" dirty="0" smtClean="0">
                 <a:hlinkClick r:id="rId2" action="ppaction://hlinksldjump"/>
               </a:rPr>
-              <a:t>Два </a:t>
-            </a:r>
-            <a:r>
-              <a:rPr lang="ru-RU" dirty="0" smtClean="0">
-                <a:hlinkClick r:id="rId2" action="ppaction://hlinksldjump"/>
-              </a:rPr>
-              <a:t>варианта генерации нагрузки в </a:t>
+              <a:t>Два варианта генерации нагрузки в </a:t>
             </a:r>
             <a:r>
               <a:rPr lang="ru-RU" dirty="0" err="1" smtClean="0">
@@ -6340,11 +6329,7 @@
             </a:r>
             <a:r>
               <a:rPr lang="ru-RU" sz="1600" dirty="0" smtClean="0"/>
-              <a:t>Плавный </a:t>
-            </a:r>
-            <a:r>
-              <a:rPr lang="ru-RU" sz="1600" dirty="0" smtClean="0"/>
-              <a:t>разгон и одна полка</a:t>
+              <a:t>Плавный разгон и одна полка</a:t>
             </a:r>
           </a:p>
           <a:p>
@@ -6354,11 +6339,7 @@
             </a:pPr>
             <a:r>
               <a:rPr lang="ru-RU" sz="1600" dirty="0" smtClean="0"/>
-              <a:t> 5 </a:t>
-            </a:r>
-            <a:r>
-              <a:rPr lang="ru-RU" sz="1600" dirty="0" smtClean="0"/>
-              <a:t>одинаковых ступеней</a:t>
+              <a:t> 5 одинаковых ступеней</a:t>
             </a:r>
           </a:p>
           <a:p>
@@ -6368,11 +6349,7 @@
             </a:pPr>
             <a:r>
               <a:rPr lang="ru-RU" sz="1600" dirty="0" smtClean="0"/>
-              <a:t> Большая </a:t>
-            </a:r>
-            <a:r>
-              <a:rPr lang="ru-RU" sz="1600" dirty="0" smtClean="0"/>
-              <a:t>первая ступень</a:t>
+              <a:t> Большая первая ступень</a:t>
             </a:r>
           </a:p>
           <a:p>
@@ -6382,11 +6359,7 @@
             </a:pPr>
             <a:r>
               <a:rPr lang="ru-RU" sz="1600" dirty="0" smtClean="0"/>
-              <a:t> Симуляция </a:t>
-            </a:r>
-            <a:r>
-              <a:rPr lang="ru-RU" sz="1600" dirty="0" smtClean="0"/>
-              <a:t>пиковой нагрузки</a:t>
+              <a:t> Симуляция пиковой нагрузки</a:t>
             </a:r>
           </a:p>
           <a:p>
@@ -6396,15 +6369,7 @@
             </a:pPr>
             <a:r>
               <a:rPr lang="ru-RU" sz="1600" dirty="0" smtClean="0"/>
-              <a:t> Однократный </a:t>
-            </a:r>
-            <a:r>
-              <a:rPr lang="ru-RU" sz="1600" dirty="0" smtClean="0"/>
-              <a:t>вызов (отладка</a:t>
-            </a:r>
-            <a:r>
-              <a:rPr lang="ru-RU" sz="1600" dirty="0" smtClean="0"/>
-              <a:t>)</a:t>
+              <a:t> Однократный вызов (отладка)</a:t>
             </a:r>
           </a:p>
           <a:p>
@@ -6434,11 +6399,7 @@
             </a:pPr>
             <a:r>
               <a:rPr lang="ru-RU" sz="1600" dirty="0" smtClean="0"/>
-              <a:t> Совсем </a:t>
-            </a:r>
-            <a:r>
-              <a:rPr lang="ru-RU" sz="1600" dirty="0" smtClean="0"/>
-              <a:t>коротко про </a:t>
+              <a:t> Совсем коротко про </a:t>
             </a:r>
             <a:r>
               <a:rPr lang="ru-RU" sz="1600" dirty="0" err="1" smtClean="0"/>
@@ -6469,11 +6430,7 @@
             </a:pPr>
             <a:r>
               <a:rPr lang="ru-RU" sz="1600" dirty="0" smtClean="0"/>
-              <a:t> Теперь </a:t>
-            </a:r>
-            <a:r>
-              <a:rPr lang="ru-RU" sz="1600" dirty="0" smtClean="0"/>
-              <a:t>детальнее (</a:t>
+              <a:t> Теперь детальнее (</a:t>
             </a:r>
             <a:r>
               <a:rPr lang="ru-RU" sz="1600" dirty="0" err="1" smtClean="0"/>
@@ -6507,11 +6464,7 @@
             </a:pPr>
             <a:r>
               <a:rPr lang="ru-RU" sz="1600" dirty="0" smtClean="0"/>
-              <a:t> Выбор </a:t>
-            </a:r>
-            <a:r>
-              <a:rPr lang="ru-RU" sz="1600" dirty="0" smtClean="0"/>
-              <a:t>подходящей модели</a:t>
+              <a:t> Выбор подходящей модели</a:t>
             </a:r>
           </a:p>
           <a:p>
@@ -6521,11 +6474,7 @@
             </a:pPr>
             <a:r>
               <a:rPr lang="ru-RU" sz="1600" dirty="0" smtClean="0"/>
-              <a:t> Пример </a:t>
-            </a:r>
-            <a:r>
-              <a:rPr lang="ru-RU" sz="1600" dirty="0" smtClean="0"/>
-              <a:t>отчета </a:t>
+              <a:t> Пример отчета </a:t>
             </a:r>
             <a:r>
               <a:rPr lang="ru-RU" sz="1600" dirty="0" err="1" smtClean="0"/>
@@ -6540,11 +6489,7 @@
             </a:pPr>
             <a:r>
               <a:rPr lang="ru-RU" sz="1600" dirty="0" smtClean="0"/>
-              <a:t> Пример </a:t>
-            </a:r>
-            <a:r>
-              <a:rPr lang="ru-RU" sz="1600" dirty="0" smtClean="0"/>
-              <a:t>отчета </a:t>
+              <a:t> Пример отчета </a:t>
             </a:r>
             <a:r>
               <a:rPr lang="ru-RU" sz="1600" dirty="0" err="1" smtClean="0"/>
@@ -7096,10 +7041,6 @@
               <a:rPr lang="ru-RU" dirty="0" smtClean="0"/>
               <a:t>Что выбрать</a:t>
             </a:r>
-            <a:r>
-              <a:rPr lang="ru-RU" dirty="0" smtClean="0"/>
-              <a:t/>
-            </a:r>
             <a:br>
               <a:rPr lang="ru-RU" dirty="0" smtClean="0"/>
             </a:br>
@@ -7222,15 +7163,7 @@
           <a:p>
             <a:r>
               <a:rPr lang="ru-RU" sz="1400" dirty="0" smtClean="0"/>
-              <a:t>Можно </a:t>
-            </a:r>
-            <a:r>
-              <a:rPr lang="ru-RU" sz="1400" dirty="0" smtClean="0"/>
-              <a:t>добавлять</a:t>
-            </a:r>
-            <a:r>
-              <a:rPr lang="ru-RU" sz="1400" dirty="0" smtClean="0"/>
-              <a:t> задержки (</a:t>
+              <a:t>Можно добавлять задержки (</a:t>
             </a:r>
             <a:r>
               <a:rPr lang="en-US" sz="1400" dirty="0" smtClean="0"/>
@@ -7248,7 +7181,6 @@
               <a:rPr lang="ru-RU" sz="1400" dirty="0" smtClean="0"/>
               <a:t>, но следить за ними не удобно.</a:t>
             </a:r>
-            <a:endParaRPr lang="ru-RU" sz="1400" dirty="0" smtClean="0"/>
           </a:p>
         </p:txBody>
       </p:sp>
@@ -7324,13 +7256,8 @@
             </a:pPr>
             <a:r>
               <a:rPr lang="ru-RU" sz="1400" dirty="0" smtClean="0"/>
-              <a:t> </a:t>
-            </a:r>
-            <a:r>
-              <a:rPr lang="ru-RU" sz="1400" dirty="0" smtClean="0"/>
-              <a:t>Более экономное использование потоков и памяти</a:t>
-            </a:r>
-            <a:endParaRPr lang="ru-RU" sz="1400" dirty="0" smtClean="0"/>
+              <a:t> Более экономное использование потоков и памяти</a:t>
+            </a:r>
           </a:p>
           <a:p>
             <a:pPr>
@@ -7597,15 +7524,7 @@
           <a:p>
             <a:r>
               <a:rPr lang="ru-RU" sz="2400" i="1" dirty="0" smtClean="0"/>
-              <a:t>Плавный </a:t>
-            </a:r>
-            <a:r>
-              <a:rPr lang="ru-RU" sz="2400" i="1" dirty="0" smtClean="0"/>
-              <a:t>разгон и одна </a:t>
-            </a:r>
-            <a:r>
-              <a:rPr lang="ru-RU" sz="2400" i="1" dirty="0" smtClean="0"/>
-              <a:t>полка</a:t>
+              <a:t>Плавный разгон и одна полка</a:t>
             </a:r>
             <a:r>
               <a:rPr lang="en-US" sz="2400" dirty="0" smtClean="0"/>
@@ -7657,11 +7576,7 @@
             </a:br>
             <a:r>
               <a:rPr lang="ru-RU" sz="1200" i="1" dirty="0" smtClean="0"/>
-              <a:t>Разгон </a:t>
-            </a:r>
-            <a:r>
-              <a:rPr lang="ru-RU" sz="1200" i="1" dirty="0" smtClean="0"/>
-              <a:t>с 0 до 5 </a:t>
+              <a:t>Разгон с 0 до 5 </a:t>
             </a:r>
             <a:r>
               <a:rPr lang="ru-RU" sz="1200" i="1" dirty="0" err="1" smtClean="0"/>
@@ -7669,22 +7584,14 @@
             </a:r>
             <a:r>
               <a:rPr lang="ru-RU" sz="1200" i="1" dirty="0" smtClean="0"/>
-              <a:t> в течение 20 </a:t>
-            </a:r>
+              <a:t> в течение 20 секунд.</a:t>
+            </a:r>
+            <a:endParaRPr lang="en-US" sz="1200" i="1" dirty="0" smtClean="0"/>
+          </a:p>
+          <a:p>
             <a:r>
               <a:rPr lang="ru-RU" sz="1200" i="1" dirty="0" smtClean="0"/>
-              <a:t>секунд.</a:t>
-            </a:r>
-            <a:endParaRPr lang="en-US" sz="1200" i="1" dirty="0" smtClean="0"/>
-          </a:p>
-          <a:p>
-            <a:r>
-              <a:rPr lang="ru-RU" sz="1200" i="1" dirty="0" smtClean="0"/>
-              <a:t>Затем </a:t>
-            </a:r>
-            <a:r>
-              <a:rPr lang="ru-RU" sz="1200" i="1" dirty="0" smtClean="0"/>
-              <a:t>постоянная нагрузка 5 </a:t>
+              <a:t>Затем постоянная нагрузка 5 </a:t>
             </a:r>
             <a:r>
               <a:rPr lang="ru-RU" sz="1200" i="1" dirty="0" err="1" smtClean="0"/>
@@ -7692,11 +7599,7 @@
             </a:r>
             <a:r>
               <a:rPr lang="ru-RU" sz="1200" i="1" dirty="0" smtClean="0"/>
-              <a:t> в течение 60 </a:t>
-            </a:r>
-            <a:r>
-              <a:rPr lang="ru-RU" sz="1200" i="1" dirty="0" smtClean="0"/>
-              <a:t>секунд.</a:t>
+              <a:t> в течение 60 секунд.</a:t>
             </a:r>
           </a:p>
           <a:p>
@@ -7948,107 +7851,35 @@
             </a:br>
             <a:r>
               <a:rPr lang="ru-RU" sz="1200" i="1" dirty="0" smtClean="0"/>
-              <a:t>  </a:t>
-            </a:r>
-            <a:r>
-              <a:rPr lang="ru-RU" sz="1200" i="1" dirty="0" smtClean="0"/>
-              <a:t> </a:t>
-            </a:r>
-            <a:r>
-              <a:rPr lang="ru-RU" sz="1200" i="1" dirty="0" smtClean="0"/>
-              <a:t>Каждая ступень увеличивается на 3 операции в </a:t>
-            </a:r>
-            <a:r>
-              <a:rPr lang="ru-RU" sz="1200" i="1" dirty="0" smtClean="0"/>
-              <a:t>секунду.</a:t>
-            </a:r>
-            <a:r>
-              <a:rPr lang="ru-RU" sz="1200" i="1" dirty="0" smtClean="0"/>
-              <a:t/>
+              <a:t>   Каждая ступень увеличивается на 3 операции в секунду.</a:t>
             </a:r>
             <a:br>
               <a:rPr lang="ru-RU" sz="1200" i="1" dirty="0" smtClean="0"/>
             </a:br>
             <a:r>
               <a:rPr lang="ru-RU" sz="1200" i="1" dirty="0" smtClean="0"/>
-              <a:t>  </a:t>
-            </a:r>
-            <a:r>
-              <a:rPr lang="ru-RU" sz="1200" i="1" dirty="0" smtClean="0"/>
-              <a:t> </a:t>
-            </a:r>
-            <a:r>
-              <a:rPr lang="ru-RU" sz="1200" i="1" dirty="0" smtClean="0"/>
-              <a:t>Всего 5 </a:t>
-            </a:r>
-            <a:r>
-              <a:rPr lang="ru-RU" sz="1200" i="1" dirty="0" smtClean="0"/>
-              <a:t>ступеней.</a:t>
-            </a:r>
-            <a:r>
-              <a:rPr lang="ru-RU" sz="1200" i="1" dirty="0" smtClean="0"/>
-              <a:t/>
+              <a:t>   Всего 5 ступеней.</a:t>
             </a:r>
             <a:br>
               <a:rPr lang="ru-RU" sz="1200" i="1" dirty="0" smtClean="0"/>
             </a:br>
             <a:r>
               <a:rPr lang="ru-RU" sz="1200" i="1" dirty="0" smtClean="0"/>
-              <a:t>  </a:t>
-            </a:r>
-            <a:r>
-              <a:rPr lang="ru-RU" sz="1200" i="1" dirty="0" smtClean="0"/>
-              <a:t> </a:t>
-            </a:r>
-            <a:r>
-              <a:rPr lang="ru-RU" sz="1200" i="1" dirty="0" smtClean="0"/>
-              <a:t>Длительность полки 20 </a:t>
-            </a:r>
-            <a:r>
-              <a:rPr lang="ru-RU" sz="1200" i="1" dirty="0" smtClean="0"/>
-              <a:t>секунд.</a:t>
-            </a:r>
-            <a:r>
-              <a:rPr lang="ru-RU" sz="1200" i="1" dirty="0" smtClean="0"/>
-              <a:t/>
+              <a:t>   Длительность полки 20 секунд.</a:t>
             </a:r>
             <a:br>
               <a:rPr lang="ru-RU" sz="1200" i="1" dirty="0" smtClean="0"/>
             </a:br>
             <a:r>
               <a:rPr lang="ru-RU" sz="1200" i="1" dirty="0" smtClean="0"/>
-              <a:t>  </a:t>
-            </a:r>
-            <a:r>
-              <a:rPr lang="ru-RU" sz="1200" i="1" dirty="0" smtClean="0"/>
-              <a:t> </a:t>
-            </a:r>
-            <a:r>
-              <a:rPr lang="ru-RU" sz="1200" i="1" dirty="0" smtClean="0"/>
-              <a:t>Выход на каждую ступень длится 10 </a:t>
-            </a:r>
-            <a:r>
-              <a:rPr lang="ru-RU" sz="1200" i="1" dirty="0" smtClean="0"/>
-              <a:t>секунд.</a:t>
-            </a:r>
-            <a:r>
-              <a:rPr lang="ru-RU" sz="1200" i="1" dirty="0" smtClean="0"/>
-              <a:t/>
+              <a:t>   Выход на каждую ступень длится 10 секунд.</a:t>
             </a:r>
             <a:br>
               <a:rPr lang="ru-RU" sz="1200" i="1" dirty="0" smtClean="0"/>
             </a:br>
             <a:r>
               <a:rPr lang="ru-RU" sz="1200" i="1" dirty="0" smtClean="0"/>
-              <a:t>  </a:t>
-            </a:r>
-            <a:r>
-              <a:rPr lang="ru-RU" sz="1200" i="1" dirty="0" smtClean="0"/>
-              <a:t> </a:t>
-            </a:r>
-            <a:r>
-              <a:rPr lang="ru-RU" sz="1200" i="1" dirty="0" smtClean="0"/>
-              <a:t>Начинается симуляция с 0 </a:t>
+              <a:t>   Начинается симуляция с 0 </a:t>
             </a:r>
             <a:r>
               <a:rPr lang="ru-RU" sz="1200" i="1" dirty="0" err="1" smtClean="0"/>
@@ -8057,10 +7888,6 @@
             <a:r>
               <a:rPr lang="ru-RU" sz="1200" i="1" dirty="0" smtClean="0"/>
               <a:t>.</a:t>
-            </a:r>
-            <a:r>
-              <a:rPr lang="ru-RU" sz="1200" i="1" dirty="0" smtClean="0"/>
-              <a:t/>
             </a:r>
             <a:br>
               <a:rPr lang="ru-RU" sz="1200" i="1" dirty="0" smtClean="0"/>
@@ -8128,15 +7955,7 @@
           <a:p>
             <a:r>
               <a:rPr lang="ru-RU" sz="2400" i="1" dirty="0" smtClean="0"/>
-              <a:t>Большая </a:t>
-            </a:r>
-            <a:r>
-              <a:rPr lang="ru-RU" sz="2400" i="1" dirty="0" smtClean="0"/>
-              <a:t>первая </a:t>
-            </a:r>
-            <a:r>
-              <a:rPr lang="ru-RU" sz="2400" i="1" dirty="0" smtClean="0"/>
-              <a:t>ступень</a:t>
+              <a:t>Большая первая ступень</a:t>
             </a:r>
             <a:r>
               <a:rPr lang="en-US" sz="2400" dirty="0" smtClean="0"/>
@@ -8181,11 +8000,7 @@
           <a:p>
             <a:r>
               <a:rPr lang="ru-RU" sz="1200" i="1" dirty="0" smtClean="0"/>
-              <a:t>   </a:t>
-            </a:r>
-            <a:r>
-              <a:rPr lang="ru-RU" sz="1200" i="1" dirty="0" smtClean="0"/>
-              <a:t>Для удобства нам потребуется минимум пара переменных:</a:t>
+              <a:t>   Для удобства нам потребуется минимум пара переменных:</a:t>
             </a:r>
             <a:br>
               <a:rPr lang="ru-RU" sz="1200" i="1" dirty="0" smtClean="0"/>
@@ -8199,15 +8014,7 @@
             </a:br>
             <a:r>
               <a:rPr lang="ru-RU" sz="1200" i="1" dirty="0" smtClean="0"/>
-              <a:t>    - EACH_STEP_INTENCITY = 10 - на сколько добавляется нагрузка на последующих </a:t>
-            </a:r>
-            <a:r>
-              <a:rPr lang="ru-RU" sz="1200" i="1" dirty="0" smtClean="0"/>
-              <a:t>ступенях.</a:t>
-            </a:r>
-            <a:r>
-              <a:rPr lang="ru-RU" sz="1200" i="1" dirty="0" smtClean="0"/>
-              <a:t/>
+              <a:t>    - EACH_STEP_INTENCITY = 10 - на сколько добавляется нагрузка на последующих ступенях.</a:t>
             </a:r>
             <a:br>
               <a:rPr lang="ru-RU" sz="1200" i="1" dirty="0" smtClean="0"/>
@@ -8222,15 +8029,7 @@
             </a:r>
             <a:r>
               <a:rPr lang="ru-RU" sz="1200" i="1" dirty="0" smtClean="0"/>
-              <a:t> в течение 5 </a:t>
-            </a:r>
-            <a:r>
-              <a:rPr lang="ru-RU" sz="1200" i="1" dirty="0" smtClean="0"/>
-              <a:t>секунд.</a:t>
-            </a:r>
-            <a:r>
-              <a:rPr lang="ru-RU" sz="1200" i="1" dirty="0" smtClean="0"/>
-              <a:t/>
+              <a:t> в течение 5 секунд.</a:t>
             </a:r>
             <a:br>
               <a:rPr lang="ru-RU" sz="1200" i="1" dirty="0" smtClean="0"/>
@@ -8245,11 +8044,7 @@
             </a:r>
             <a:r>
               <a:rPr lang="ru-RU" sz="1200" i="1" dirty="0" smtClean="0"/>
-              <a:t> </a:t>
-            </a:r>
-            <a:r>
-              <a:rPr lang="ru-RU" sz="1200" i="1" dirty="0" smtClean="0"/>
-              <a:t>каждая.</a:t>
+              <a:t> каждая.</a:t>
             </a:r>
             <a:endParaRPr lang="ru-RU" sz="1200" dirty="0" smtClean="0"/>
           </a:p>
@@ -8379,27 +8174,7 @@
           <a:p>
             <a:r>
               <a:rPr lang="ru-RU" sz="2400" i="1" dirty="0" smtClean="0"/>
-              <a:t>Симуляция пиковой нагрузки, тест на </a:t>
-            </a:r>
-            <a:r>
-              <a:rPr lang="ru-RU" sz="2400" i="1" dirty="0" smtClean="0"/>
-              <a:t>восстан</a:t>
-            </a:r>
-            <a:r>
-              <a:rPr lang="ru-RU" sz="2400" i="1" dirty="0" smtClean="0"/>
-              <a:t>о</a:t>
-            </a:r>
-            <a:r>
-              <a:rPr lang="ru-RU" sz="2400" i="1" dirty="0" smtClean="0"/>
-              <a:t>вление </a:t>
-            </a:r>
-            <a:r>
-              <a:rPr lang="ru-RU" sz="2400" i="1" dirty="0" smtClean="0"/>
-              <a:t>работы </a:t>
-            </a:r>
-            <a:r>
-              <a:rPr lang="ru-RU" sz="2400" i="1" dirty="0" smtClean="0"/>
-              <a:t>системы</a:t>
+              <a:t>Симуляция пиковой нагрузки, тест на восстановление работы системы</a:t>
             </a:r>
             <a:endParaRPr lang="en-US" sz="1200" dirty="0">
               <a:latin typeface="Arial" pitchFamily="34" charset="0"/>
@@ -8446,11 +8221,7 @@
           <a:p>
             <a:r>
               <a:rPr lang="ru-RU" sz="1200" i="1" dirty="0" smtClean="0"/>
-              <a:t>Разгон </a:t>
-            </a:r>
-            <a:r>
-              <a:rPr lang="ru-RU" sz="1200" i="1" dirty="0" smtClean="0"/>
-              <a:t>от 0 до 15 </a:t>
+              <a:t>Разгон от 0 до 15 </a:t>
             </a:r>
             <a:r>
               <a:rPr lang="ru-RU" sz="1200" i="1" dirty="0" err="1" smtClean="0"/>
@@ -8480,7 +8251,19 @@
             </a:br>
             <a:r>
               <a:rPr lang="ru-RU" sz="1200" i="1" dirty="0" smtClean="0"/>
-              <a:t>Затем в течение 15 секунд входит 1000 пользователей (выполняют по одной итерации)</a:t>
+              <a:t>Затем в </a:t>
+            </a:r>
+            <a:r>
+              <a:rPr lang="ru-RU" sz="1200" i="1" smtClean="0"/>
+              <a:t>течение </a:t>
+            </a:r>
+            <a:r>
+              <a:rPr lang="ru-RU" sz="1200" i="1" smtClean="0"/>
+              <a:t>20 секунд </a:t>
+            </a:r>
+            <a:r>
+              <a:rPr lang="ru-RU" sz="1200" i="1" dirty="0" smtClean="0"/>
+              <a:t>входит 1000 пользователей (выполняют по одной итерации)</a:t>
             </a:r>
             <a:br>
               <a:rPr lang="ru-RU" sz="1200" i="1" dirty="0" smtClean="0"/>

</xml_diff>